<commit_message>
Fracture growth to do
</commit_message>
<xml_diff>
--- a/Pics/Illustrations.pptx
+++ b/Pics/Illustrations.pptx
@@ -201,7 +201,7 @@
           <a:p>
             <a:fld id="{D4132F78-145B-4E09-A749-FC2612A50C34}" type="datetimeFigureOut">
               <a:rPr lang="ru-RU" smtClean="0"/>
-              <a:t>07.05.2024</a:t>
+              <a:t>14.05.2024</a:t>
             </a:fld>
             <a:endParaRPr lang="ru-RU"/>
           </a:p>
@@ -699,7 +699,7 @@
           <a:p>
             <a:fld id="{0D7D8A5E-F820-4C45-897A-B8B30BC14499}" type="datetimeFigureOut">
               <a:rPr lang="ru-RU" smtClean="0"/>
-              <a:t>07.05.2024</a:t>
+              <a:t>14.05.2024</a:t>
             </a:fld>
             <a:endParaRPr lang="ru-RU"/>
           </a:p>
@@ -897,7 +897,7 @@
           <a:p>
             <a:fld id="{0D7D8A5E-F820-4C45-897A-B8B30BC14499}" type="datetimeFigureOut">
               <a:rPr lang="ru-RU" smtClean="0"/>
-              <a:t>07.05.2024</a:t>
+              <a:t>14.05.2024</a:t>
             </a:fld>
             <a:endParaRPr lang="ru-RU"/>
           </a:p>
@@ -1105,7 +1105,7 @@
           <a:p>
             <a:fld id="{0D7D8A5E-F820-4C45-897A-B8B30BC14499}" type="datetimeFigureOut">
               <a:rPr lang="ru-RU" smtClean="0"/>
-              <a:t>07.05.2024</a:t>
+              <a:t>14.05.2024</a:t>
             </a:fld>
             <a:endParaRPr lang="ru-RU"/>
           </a:p>
@@ -1303,7 +1303,7 @@
           <a:p>
             <a:fld id="{0D7D8A5E-F820-4C45-897A-B8B30BC14499}" type="datetimeFigureOut">
               <a:rPr lang="ru-RU" smtClean="0"/>
-              <a:t>07.05.2024</a:t>
+              <a:t>14.05.2024</a:t>
             </a:fld>
             <a:endParaRPr lang="ru-RU"/>
           </a:p>
@@ -1578,7 +1578,7 @@
           <a:p>
             <a:fld id="{0D7D8A5E-F820-4C45-897A-B8B30BC14499}" type="datetimeFigureOut">
               <a:rPr lang="ru-RU" smtClean="0"/>
-              <a:t>07.05.2024</a:t>
+              <a:t>14.05.2024</a:t>
             </a:fld>
             <a:endParaRPr lang="ru-RU"/>
           </a:p>
@@ -1843,7 +1843,7 @@
           <a:p>
             <a:fld id="{0D7D8A5E-F820-4C45-897A-B8B30BC14499}" type="datetimeFigureOut">
               <a:rPr lang="ru-RU" smtClean="0"/>
-              <a:t>07.05.2024</a:t>
+              <a:t>14.05.2024</a:t>
             </a:fld>
             <a:endParaRPr lang="ru-RU"/>
           </a:p>
@@ -2255,7 +2255,7 @@
           <a:p>
             <a:fld id="{0D7D8A5E-F820-4C45-897A-B8B30BC14499}" type="datetimeFigureOut">
               <a:rPr lang="ru-RU" smtClean="0"/>
-              <a:t>07.05.2024</a:t>
+              <a:t>14.05.2024</a:t>
             </a:fld>
             <a:endParaRPr lang="ru-RU"/>
           </a:p>
@@ -2396,7 +2396,7 @@
           <a:p>
             <a:fld id="{0D7D8A5E-F820-4C45-897A-B8B30BC14499}" type="datetimeFigureOut">
               <a:rPr lang="ru-RU" smtClean="0"/>
-              <a:t>07.05.2024</a:t>
+              <a:t>14.05.2024</a:t>
             </a:fld>
             <a:endParaRPr lang="ru-RU"/>
           </a:p>
@@ -2509,7 +2509,7 @@
           <a:p>
             <a:fld id="{0D7D8A5E-F820-4C45-897A-B8B30BC14499}" type="datetimeFigureOut">
               <a:rPr lang="ru-RU" smtClean="0"/>
-              <a:t>07.05.2024</a:t>
+              <a:t>14.05.2024</a:t>
             </a:fld>
             <a:endParaRPr lang="ru-RU"/>
           </a:p>
@@ -2820,7 +2820,7 @@
           <a:p>
             <a:fld id="{0D7D8A5E-F820-4C45-897A-B8B30BC14499}" type="datetimeFigureOut">
               <a:rPr lang="ru-RU" smtClean="0"/>
-              <a:t>07.05.2024</a:t>
+              <a:t>14.05.2024</a:t>
             </a:fld>
             <a:endParaRPr lang="ru-RU"/>
           </a:p>
@@ -3108,7 +3108,7 @@
           <a:p>
             <a:fld id="{0D7D8A5E-F820-4C45-897A-B8B30BC14499}" type="datetimeFigureOut">
               <a:rPr lang="ru-RU" smtClean="0"/>
-              <a:t>07.05.2024</a:t>
+              <a:t>14.05.2024</a:t>
             </a:fld>
             <a:endParaRPr lang="ru-RU"/>
           </a:p>
@@ -3349,7 +3349,7 @@
           <a:p>
             <a:fld id="{0D7D8A5E-F820-4C45-897A-B8B30BC14499}" type="datetimeFigureOut">
               <a:rPr lang="ru-RU" smtClean="0"/>
-              <a:t>07.05.2024</a:t>
+              <a:t>14.05.2024</a:t>
             </a:fld>
             <a:endParaRPr lang="ru-RU"/>
           </a:p>
@@ -4247,8 +4247,8 @@
               </p:style>
             </p:cxnSp>
           </p:grpSp>
-          <mc:AlternateContent xmlns:mc="http://schemas.openxmlformats.org/markup-compatibility/2006">
-            <mc:Choice xmlns:a14="http://schemas.microsoft.com/office/drawing/2010/main" Requires="a14">
+          <mc:AlternateContent xmlns:mc="http://schemas.openxmlformats.org/markup-compatibility/2006" xmlns:a14="http://schemas.microsoft.com/office/drawing/2010/main">
+            <mc:Choice Requires="a14">
               <p:sp>
                 <p:nvSpPr>
                   <p:cNvPr id="25" name="TextBox 24">
@@ -4325,7 +4325,7 @@
                 </p:txBody>
               </p:sp>
             </mc:Choice>
-            <mc:Fallback>
+            <mc:Fallback xmlns="">
               <p:sp>
                 <p:nvSpPr>
                   <p:cNvPr id="25" name="TextBox 24">
@@ -4370,8 +4370,8 @@
               </p:sp>
             </mc:Fallback>
           </mc:AlternateContent>
-          <mc:AlternateContent xmlns:mc="http://schemas.openxmlformats.org/markup-compatibility/2006">
-            <mc:Choice xmlns:a14="http://schemas.microsoft.com/office/drawing/2010/main" Requires="a14">
+          <mc:AlternateContent xmlns:mc="http://schemas.openxmlformats.org/markup-compatibility/2006" xmlns:a14="http://schemas.microsoft.com/office/drawing/2010/main">
+            <mc:Choice Requires="a14">
               <p:sp>
                 <p:nvSpPr>
                   <p:cNvPr id="26" name="TextBox 25">
@@ -4448,7 +4448,7 @@
                 </p:txBody>
               </p:sp>
             </mc:Choice>
-            <mc:Fallback>
+            <mc:Fallback xmlns="">
               <p:sp>
                 <p:nvSpPr>
                   <p:cNvPr id="26" name="TextBox 25">
@@ -4493,8 +4493,8 @@
               </p:sp>
             </mc:Fallback>
           </mc:AlternateContent>
-          <mc:AlternateContent xmlns:mc="http://schemas.openxmlformats.org/markup-compatibility/2006">
-            <mc:Choice xmlns:a14="http://schemas.microsoft.com/office/drawing/2010/main" Requires="a14">
+          <mc:AlternateContent xmlns:mc="http://schemas.openxmlformats.org/markup-compatibility/2006" xmlns:a14="http://schemas.microsoft.com/office/drawing/2010/main">
+            <mc:Choice Requires="a14">
               <p:sp>
                 <p:nvSpPr>
                   <p:cNvPr id="27" name="TextBox 26">
@@ -4571,7 +4571,7 @@
                 </p:txBody>
               </p:sp>
             </mc:Choice>
-            <mc:Fallback>
+            <mc:Fallback xmlns="">
               <p:sp>
                 <p:nvSpPr>
                   <p:cNvPr id="27" name="TextBox 26">
@@ -4616,8 +4616,8 @@
               </p:sp>
             </mc:Fallback>
           </mc:AlternateContent>
-          <mc:AlternateContent xmlns:mc="http://schemas.openxmlformats.org/markup-compatibility/2006">
-            <mc:Choice xmlns:a14="http://schemas.microsoft.com/office/drawing/2010/main" Requires="a14">
+          <mc:AlternateContent xmlns:mc="http://schemas.openxmlformats.org/markup-compatibility/2006" xmlns:a14="http://schemas.microsoft.com/office/drawing/2010/main">
+            <mc:Choice Requires="a14">
               <p:sp>
                 <p:nvSpPr>
                   <p:cNvPr id="28" name="TextBox 27">
@@ -4694,7 +4694,7 @@
                 </p:txBody>
               </p:sp>
             </mc:Choice>
-            <mc:Fallback>
+            <mc:Fallback xmlns="">
               <p:sp>
                 <p:nvSpPr>
                   <p:cNvPr id="28" name="TextBox 27">
@@ -4739,8 +4739,8 @@
               </p:sp>
             </mc:Fallback>
           </mc:AlternateContent>
-          <mc:AlternateContent xmlns:mc="http://schemas.openxmlformats.org/markup-compatibility/2006">
-            <mc:Choice xmlns:a14="http://schemas.microsoft.com/office/drawing/2010/main" Requires="a14">
+          <mc:AlternateContent xmlns:mc="http://schemas.openxmlformats.org/markup-compatibility/2006" xmlns:a14="http://schemas.microsoft.com/office/drawing/2010/main">
+            <mc:Choice Requires="a14">
               <p:sp>
                 <p:nvSpPr>
                   <p:cNvPr id="29" name="TextBox 28">
@@ -4817,7 +4817,7 @@
                 </p:txBody>
               </p:sp>
             </mc:Choice>
-            <mc:Fallback>
+            <mc:Fallback xmlns="">
               <p:sp>
                 <p:nvSpPr>
                   <p:cNvPr id="29" name="TextBox 28">
@@ -4863,8 +4863,8 @@
             </mc:Fallback>
           </mc:AlternateContent>
         </p:grpSp>
-        <mc:AlternateContent xmlns:mc="http://schemas.openxmlformats.org/markup-compatibility/2006">
-          <mc:Choice xmlns:a14="http://schemas.microsoft.com/office/drawing/2010/main" Requires="a14">
+        <mc:AlternateContent xmlns:mc="http://schemas.openxmlformats.org/markup-compatibility/2006" xmlns:a14="http://schemas.microsoft.com/office/drawing/2010/main">
+          <mc:Choice Requires="a14">
             <p:sp>
               <p:nvSpPr>
                 <p:cNvPr id="16" name="TextBox 15">
@@ -4920,7 +4920,7 @@
               </p:txBody>
             </p:sp>
           </mc:Choice>
-          <mc:Fallback>
+          <mc:Fallback xmlns="">
             <p:sp>
               <p:nvSpPr>
                 <p:cNvPr id="16" name="TextBox 15">
@@ -5414,8 +5414,8 @@
           </p:sp>
         </mc:Fallback>
       </mc:AlternateContent>
-      <mc:AlternateContent xmlns:mc="http://schemas.openxmlformats.org/markup-compatibility/2006" xmlns:a14="http://schemas.microsoft.com/office/drawing/2010/main">
-        <mc:Choice Requires="a14">
+      <mc:AlternateContent xmlns:mc="http://schemas.openxmlformats.org/markup-compatibility/2006">
+        <mc:Choice xmlns:a14="http://schemas.microsoft.com/office/drawing/2010/main" Requires="a14">
           <p:sp>
             <p:nvSpPr>
               <p:cNvPr id="19" name="TextBox 18">
@@ -5430,7 +5430,7 @@
             </p:nvSpPr>
             <p:spPr>
               <a:xfrm>
-                <a:off x="5168764" y="4441727"/>
+                <a:off x="5582222" y="4552641"/>
                 <a:ext cx="252184" cy="299249"/>
               </a:xfrm>
               <a:prstGeom prst="rect">
@@ -5455,6 +5455,9 @@
                         <m:sSubPr>
                           <m:ctrlPr>
                             <a:rPr lang="el-GR" i="1" smtClean="0">
+                              <a:solidFill>
+                                <a:srgbClr val="00B050"/>
+                              </a:solidFill>
                               <a:latin typeface="Cambria Math" panose="02040503050406030204" pitchFamily="18" charset="0"/>
                               <a:ea typeface="Cambria Math" panose="02040503050406030204" pitchFamily="18" charset="0"/>
                             </a:rPr>
@@ -5466,6 +5469,9 @@
                               <m:sty m:val="p"/>
                             </m:rPr>
                             <a:rPr lang="el-GR" i="1" smtClean="0">
+                              <a:solidFill>
+                                <a:srgbClr val="00B050"/>
+                              </a:solidFill>
                               <a:latin typeface="Cambria Math" panose="02040503050406030204" pitchFamily="18" charset="0"/>
                               <a:ea typeface="Cambria Math" panose="02040503050406030204" pitchFamily="18" charset="0"/>
                             </a:rPr>
@@ -5475,6 +5481,9 @@
                         <m:sub>
                           <m:r>
                             <a:rPr lang="en-US" b="0" i="1" smtClean="0">
+                              <a:solidFill>
+                                <a:srgbClr val="00B050"/>
+                              </a:solidFill>
                               <a:latin typeface="Cambria Math" panose="02040503050406030204" pitchFamily="18" charset="0"/>
                               <a:ea typeface="Cambria Math" panose="02040503050406030204" pitchFamily="18" charset="0"/>
                             </a:rPr>
@@ -5490,7 +5499,7 @@
             </p:txBody>
           </p:sp>
         </mc:Choice>
-        <mc:Fallback xmlns="">
+        <mc:Fallback>
           <p:sp>
             <p:nvSpPr>
               <p:cNvPr id="19" name="TextBox 18">
@@ -5507,7 +5516,7 @@
             </p:nvSpPr>
             <p:spPr>
               <a:xfrm>
-                <a:off x="5168764" y="4441727"/>
+                <a:off x="5582222" y="4552641"/>
                 <a:ext cx="252184" cy="299249"/>
               </a:xfrm>
               <a:prstGeom prst="rect">
@@ -6231,13 +6240,16 @@
               </a:ext>
             </a:extLst>
           </p:cNvPr>
-          <p:cNvCxnSpPr/>
+          <p:cNvCxnSpPr>
+            <a:cxnSpLocks/>
+            <a:stCxn id="25" idx="2"/>
+          </p:cNvCxnSpPr>
           <p:nvPr/>
         </p:nvCxnSpPr>
         <p:spPr>
           <a:xfrm>
-            <a:off x="3899530" y="4264481"/>
-            <a:ext cx="3054834" cy="0"/>
+            <a:off x="4753361" y="4260362"/>
+            <a:ext cx="1909906" cy="0"/>
           </a:xfrm>
           <a:prstGeom prst="line">
             <a:avLst/>
@@ -6466,6 +6478,598 @@
                 <a:blip r:embed="rId10"/>
                 <a:stretch>
                   <a:fillRect l="-23913" r="-26087" b="-6667"/>
+                </a:stretch>
+              </a:blipFill>
+            </p:spPr>
+            <p:txBody>
+              <a:bodyPr/>
+              <a:lstStyle/>
+              <a:p>
+                <a:r>
+                  <a:rPr lang="ru-RU">
+                    <a:noFill/>
+                  </a:rPr>
+                  <a:t> </a:t>
+                </a:r>
+              </a:p>
+            </p:txBody>
+          </p:sp>
+        </mc:Fallback>
+      </mc:AlternateContent>
+      <p:cxnSp>
+        <p:nvCxnSpPr>
+          <p:cNvPr id="13" name="Прямая соединительная линия 12">
+            <a:extLst>
+              <a:ext uri="{FF2B5EF4-FFF2-40B4-BE49-F238E27FC236}">
+                <a16:creationId xmlns:a16="http://schemas.microsoft.com/office/drawing/2014/main" id="{DA95DE56-EEDD-425E-931E-9854879A00E2}"/>
+              </a:ext>
+            </a:extLst>
+          </p:cNvPr>
+          <p:cNvCxnSpPr>
+            <a:cxnSpLocks/>
+          </p:cNvCxnSpPr>
+          <p:nvPr/>
+        </p:nvCxnSpPr>
+        <p:spPr>
+          <a:xfrm>
+            <a:off x="4753361" y="4188151"/>
+            <a:ext cx="0" cy="144421"/>
+          </a:xfrm>
+          <a:prstGeom prst="line">
+            <a:avLst/>
+          </a:prstGeom>
+          <a:ln w="38100">
+            <a:solidFill>
+              <a:srgbClr val="FF0000"/>
+            </a:solidFill>
+          </a:ln>
+        </p:spPr>
+        <p:style>
+          <a:lnRef idx="1">
+            <a:schemeClr val="accent1"/>
+          </a:lnRef>
+          <a:fillRef idx="0">
+            <a:schemeClr val="accent1"/>
+          </a:fillRef>
+          <a:effectRef idx="0">
+            <a:schemeClr val="accent1"/>
+          </a:effectRef>
+          <a:fontRef idx="minor">
+            <a:schemeClr val="tx1"/>
+          </a:fontRef>
+        </p:style>
+      </p:cxnSp>
+      <p:cxnSp>
+        <p:nvCxnSpPr>
+          <p:cNvPr id="28" name="Прямая соединительная линия 27">
+            <a:extLst>
+              <a:ext uri="{FF2B5EF4-FFF2-40B4-BE49-F238E27FC236}">
+                <a16:creationId xmlns:a16="http://schemas.microsoft.com/office/drawing/2014/main" id="{CC1E47F6-596E-4AF1-9BB8-B4CEF32FBB93}"/>
+              </a:ext>
+            </a:extLst>
+          </p:cNvPr>
+          <p:cNvCxnSpPr>
+            <a:cxnSpLocks/>
+          </p:cNvCxnSpPr>
+          <p:nvPr/>
+        </p:nvCxnSpPr>
+        <p:spPr>
+          <a:xfrm>
+            <a:off x="5420276" y="4177503"/>
+            <a:ext cx="0" cy="144421"/>
+          </a:xfrm>
+          <a:prstGeom prst="line">
+            <a:avLst/>
+          </a:prstGeom>
+          <a:ln w="38100">
+            <a:solidFill>
+              <a:srgbClr val="FF0000"/>
+            </a:solidFill>
+          </a:ln>
+        </p:spPr>
+        <p:style>
+          <a:lnRef idx="1">
+            <a:schemeClr val="accent1"/>
+          </a:lnRef>
+          <a:fillRef idx="0">
+            <a:schemeClr val="accent1"/>
+          </a:fillRef>
+          <a:effectRef idx="0">
+            <a:schemeClr val="accent1"/>
+          </a:effectRef>
+          <a:fontRef idx="minor">
+            <a:schemeClr val="tx1"/>
+          </a:fontRef>
+        </p:style>
+      </p:cxnSp>
+      <p:cxnSp>
+        <p:nvCxnSpPr>
+          <p:cNvPr id="29" name="Прямая соединительная линия 28">
+            <a:extLst>
+              <a:ext uri="{FF2B5EF4-FFF2-40B4-BE49-F238E27FC236}">
+                <a16:creationId xmlns:a16="http://schemas.microsoft.com/office/drawing/2014/main" id="{A5521061-20E9-4BE9-8650-300FA2DC816B}"/>
+              </a:ext>
+            </a:extLst>
+          </p:cNvPr>
+          <p:cNvCxnSpPr>
+            <a:cxnSpLocks/>
+          </p:cNvCxnSpPr>
+          <p:nvPr/>
+        </p:nvCxnSpPr>
+        <p:spPr>
+          <a:xfrm>
+            <a:off x="6375656" y="4177503"/>
+            <a:ext cx="0" cy="144421"/>
+          </a:xfrm>
+          <a:prstGeom prst="line">
+            <a:avLst/>
+          </a:prstGeom>
+          <a:ln w="38100">
+            <a:solidFill>
+              <a:srgbClr val="FF0000"/>
+            </a:solidFill>
+          </a:ln>
+        </p:spPr>
+        <p:style>
+          <a:lnRef idx="1">
+            <a:schemeClr val="accent1"/>
+          </a:lnRef>
+          <a:fillRef idx="0">
+            <a:schemeClr val="accent1"/>
+          </a:fillRef>
+          <a:effectRef idx="0">
+            <a:schemeClr val="accent1"/>
+          </a:effectRef>
+          <a:fontRef idx="minor">
+            <a:schemeClr val="tx1"/>
+          </a:fontRef>
+        </p:style>
+      </p:cxnSp>
+      <p:cxnSp>
+        <p:nvCxnSpPr>
+          <p:cNvPr id="30" name="Прямая соединительная линия 29">
+            <a:extLst>
+              <a:ext uri="{FF2B5EF4-FFF2-40B4-BE49-F238E27FC236}">
+                <a16:creationId xmlns:a16="http://schemas.microsoft.com/office/drawing/2014/main" id="{1E4E4908-DC36-42D7-85D4-A37B1C462C05}"/>
+              </a:ext>
+            </a:extLst>
+          </p:cNvPr>
+          <p:cNvCxnSpPr>
+            <a:cxnSpLocks/>
+          </p:cNvCxnSpPr>
+          <p:nvPr/>
+        </p:nvCxnSpPr>
+        <p:spPr>
+          <a:xfrm>
+            <a:off x="6673178" y="4174002"/>
+            <a:ext cx="0" cy="144421"/>
+          </a:xfrm>
+          <a:prstGeom prst="line">
+            <a:avLst/>
+          </a:prstGeom>
+          <a:ln w="38100">
+            <a:solidFill>
+              <a:srgbClr val="FF0000"/>
+            </a:solidFill>
+          </a:ln>
+        </p:spPr>
+        <p:style>
+          <a:lnRef idx="1">
+            <a:schemeClr val="accent1"/>
+          </a:lnRef>
+          <a:fillRef idx="0">
+            <a:schemeClr val="accent1"/>
+          </a:fillRef>
+          <a:effectRef idx="0">
+            <a:schemeClr val="accent1"/>
+          </a:effectRef>
+          <a:fontRef idx="minor">
+            <a:schemeClr val="tx1"/>
+          </a:fontRef>
+        </p:style>
+      </p:cxnSp>
+      <mc:AlternateContent xmlns:mc="http://schemas.openxmlformats.org/markup-compatibility/2006">
+        <mc:Choice xmlns:a14="http://schemas.microsoft.com/office/drawing/2010/main" Requires="a14">
+          <p:sp>
+            <p:nvSpPr>
+              <p:cNvPr id="31" name="TextBox 30">
+                <a:extLst>
+                  <a:ext uri="{FF2B5EF4-FFF2-40B4-BE49-F238E27FC236}">
+                    <a16:creationId xmlns:a16="http://schemas.microsoft.com/office/drawing/2014/main" id="{BC11985E-754C-464C-B6DE-A0235BF0B962}"/>
+                  </a:ext>
+                </a:extLst>
+              </p:cNvPr>
+              <p:cNvSpPr txBox="1"/>
+              <p:nvPr/>
+            </p:nvSpPr>
+            <p:spPr>
+              <a:xfrm>
+                <a:off x="4989164" y="3948454"/>
+                <a:ext cx="267124" cy="232692"/>
+              </a:xfrm>
+              <a:prstGeom prst="rect">
+                <a:avLst/>
+              </a:prstGeom>
+              <a:noFill/>
+            </p:spPr>
+            <p:txBody>
+              <a:bodyPr wrap="none" lIns="0" tIns="0" rIns="0" bIns="0" rtlCol="0">
+                <a:spAutoFit/>
+              </a:bodyPr>
+              <a:lstStyle/>
+              <a:p>
+                <a:pPr/>
+                <a14:m>
+                  <m:oMathPara xmlns:m="http://schemas.openxmlformats.org/officeDocument/2006/math">
+                    <m:oMathParaPr>
+                      <m:jc m:val="centerGroup"/>
+                    </m:oMathParaPr>
+                    <m:oMath xmlns:m="http://schemas.openxmlformats.org/officeDocument/2006/math">
+                      <m:sSub>
+                        <m:sSubPr>
+                          <m:ctrlPr>
+                            <a:rPr lang="el-GR" sz="1400" i="1" smtClean="0">
+                              <a:solidFill>
+                                <a:srgbClr val="FF0000"/>
+                              </a:solidFill>
+                              <a:latin typeface="Cambria Math" panose="02040503050406030204" pitchFamily="18" charset="0"/>
+                              <a:ea typeface="Cambria Math" panose="02040503050406030204" pitchFamily="18" charset="0"/>
+                            </a:rPr>
+                          </m:ctrlPr>
+                        </m:sSubPr>
+                        <m:e>
+                          <m:r>
+                            <m:rPr>
+                              <m:sty m:val="p"/>
+                            </m:rPr>
+                            <a:rPr lang="el-GR" sz="1400" i="1" smtClean="0">
+                              <a:solidFill>
+                                <a:srgbClr val="FF0000"/>
+                              </a:solidFill>
+                              <a:latin typeface="Cambria Math" panose="02040503050406030204" pitchFamily="18" charset="0"/>
+                              <a:ea typeface="Cambria Math" panose="02040503050406030204" pitchFamily="18" charset="0"/>
+                            </a:rPr>
+                            <m:t>Γ</m:t>
+                          </m:r>
+                        </m:e>
+                        <m:sub>
+                          <m:r>
+                            <a:rPr lang="en-US" sz="1400" b="0" i="1" smtClean="0">
+                              <a:solidFill>
+                                <a:srgbClr val="FF0000"/>
+                              </a:solidFill>
+                              <a:latin typeface="Cambria Math" panose="02040503050406030204" pitchFamily="18" charset="0"/>
+                              <a:ea typeface="Cambria Math" panose="02040503050406030204" pitchFamily="18" charset="0"/>
+                            </a:rPr>
+                            <m:t>𝑓</m:t>
+                          </m:r>
+                          <m:r>
+                            <a:rPr lang="ru-RU" sz="1400" b="0" i="1" smtClean="0">
+                              <a:solidFill>
+                                <a:srgbClr val="FF0000"/>
+                              </a:solidFill>
+                              <a:latin typeface="Cambria Math" panose="02040503050406030204" pitchFamily="18" charset="0"/>
+                              <a:ea typeface="Cambria Math" panose="02040503050406030204" pitchFamily="18" charset="0"/>
+                            </a:rPr>
+                            <m:t>1</m:t>
+                          </m:r>
+                        </m:sub>
+                      </m:sSub>
+                    </m:oMath>
+                  </m:oMathPara>
+                </a14:m>
+                <a:endParaRPr lang="ru-RU" dirty="0"/>
+              </a:p>
+            </p:txBody>
+          </p:sp>
+        </mc:Choice>
+        <mc:Fallback>
+          <p:sp>
+            <p:nvSpPr>
+              <p:cNvPr id="31" name="TextBox 30">
+                <a:extLst>
+                  <a:ext uri="{FF2B5EF4-FFF2-40B4-BE49-F238E27FC236}">
+                    <a16:creationId xmlns:a16="http://schemas.microsoft.com/office/drawing/2014/main" id="{BC11985E-754C-464C-B6DE-A0235BF0B962}"/>
+                  </a:ext>
+                </a:extLst>
+              </p:cNvPr>
+              <p:cNvSpPr txBox="1">
+                <a:spLocks noRot="1" noChangeAspect="1" noMove="1" noResize="1" noEditPoints="1" noAdjustHandles="1" noChangeArrowheads="1" noChangeShapeType="1" noTextEdit="1"/>
+              </p:cNvSpPr>
+              <p:nvPr/>
+            </p:nvSpPr>
+            <p:spPr>
+              <a:xfrm>
+                <a:off x="4989164" y="3948454"/>
+                <a:ext cx="267124" cy="232692"/>
+              </a:xfrm>
+              <a:prstGeom prst="rect">
+                <a:avLst/>
+              </a:prstGeom>
+              <a:blipFill>
+                <a:blip r:embed="rId11"/>
+                <a:stretch>
+                  <a:fillRect l="-15909" r="-4545" b="-23684"/>
+                </a:stretch>
+              </a:blipFill>
+            </p:spPr>
+            <p:txBody>
+              <a:bodyPr/>
+              <a:lstStyle/>
+              <a:p>
+                <a:r>
+                  <a:rPr lang="ru-RU">
+                    <a:noFill/>
+                  </a:rPr>
+                  <a:t> </a:t>
+                </a:r>
+              </a:p>
+            </p:txBody>
+          </p:sp>
+        </mc:Fallback>
+      </mc:AlternateContent>
+      <mc:AlternateContent xmlns:mc="http://schemas.openxmlformats.org/markup-compatibility/2006">
+        <mc:Choice xmlns:a14="http://schemas.microsoft.com/office/drawing/2010/main" Requires="a14">
+          <p:sp>
+            <p:nvSpPr>
+              <p:cNvPr id="32" name="TextBox 31">
+                <a:extLst>
+                  <a:ext uri="{FF2B5EF4-FFF2-40B4-BE49-F238E27FC236}">
+                    <a16:creationId xmlns:a16="http://schemas.microsoft.com/office/drawing/2014/main" id="{42130AAA-31D0-496F-8D1A-960C82851A2F}"/>
+                  </a:ext>
+                </a:extLst>
+              </p:cNvPr>
+              <p:cNvSpPr txBox="1"/>
+              <p:nvPr/>
+            </p:nvSpPr>
+            <p:spPr>
+              <a:xfrm>
+                <a:off x="5781128" y="3942105"/>
+                <a:ext cx="267124" cy="232692"/>
+              </a:xfrm>
+              <a:prstGeom prst="rect">
+                <a:avLst/>
+              </a:prstGeom>
+              <a:noFill/>
+            </p:spPr>
+            <p:txBody>
+              <a:bodyPr wrap="none" lIns="0" tIns="0" rIns="0" bIns="0" rtlCol="0">
+                <a:spAutoFit/>
+              </a:bodyPr>
+              <a:lstStyle/>
+              <a:p>
+                <a:pPr/>
+                <a14:m>
+                  <m:oMathPara xmlns:m="http://schemas.openxmlformats.org/officeDocument/2006/math">
+                    <m:oMathParaPr>
+                      <m:jc m:val="centerGroup"/>
+                    </m:oMathParaPr>
+                    <m:oMath xmlns:m="http://schemas.openxmlformats.org/officeDocument/2006/math">
+                      <m:sSub>
+                        <m:sSubPr>
+                          <m:ctrlPr>
+                            <a:rPr lang="el-GR" sz="1400" i="1" smtClean="0">
+                              <a:solidFill>
+                                <a:srgbClr val="FF0000"/>
+                              </a:solidFill>
+                              <a:latin typeface="Cambria Math" panose="02040503050406030204" pitchFamily="18" charset="0"/>
+                              <a:ea typeface="Cambria Math" panose="02040503050406030204" pitchFamily="18" charset="0"/>
+                            </a:rPr>
+                          </m:ctrlPr>
+                        </m:sSubPr>
+                        <m:e>
+                          <m:r>
+                            <m:rPr>
+                              <m:sty m:val="p"/>
+                            </m:rPr>
+                            <a:rPr lang="el-GR" sz="1400" i="1" smtClean="0">
+                              <a:solidFill>
+                                <a:srgbClr val="FF0000"/>
+                              </a:solidFill>
+                              <a:latin typeface="Cambria Math" panose="02040503050406030204" pitchFamily="18" charset="0"/>
+                              <a:ea typeface="Cambria Math" panose="02040503050406030204" pitchFamily="18" charset="0"/>
+                            </a:rPr>
+                            <m:t>Γ</m:t>
+                          </m:r>
+                        </m:e>
+                        <m:sub>
+                          <m:r>
+                            <a:rPr lang="en-US" sz="1400" b="0" i="1" smtClean="0">
+                              <a:solidFill>
+                                <a:srgbClr val="FF0000"/>
+                              </a:solidFill>
+                              <a:latin typeface="Cambria Math" panose="02040503050406030204" pitchFamily="18" charset="0"/>
+                              <a:ea typeface="Cambria Math" panose="02040503050406030204" pitchFamily="18" charset="0"/>
+                            </a:rPr>
+                            <m:t>𝑓</m:t>
+                          </m:r>
+                          <m:r>
+                            <a:rPr lang="ru-RU" sz="1400" b="0" i="1" smtClean="0">
+                              <a:solidFill>
+                                <a:srgbClr val="FF0000"/>
+                              </a:solidFill>
+                              <a:latin typeface="Cambria Math" panose="02040503050406030204" pitchFamily="18" charset="0"/>
+                              <a:ea typeface="Cambria Math" panose="02040503050406030204" pitchFamily="18" charset="0"/>
+                            </a:rPr>
+                            <m:t>2</m:t>
+                          </m:r>
+                        </m:sub>
+                      </m:sSub>
+                    </m:oMath>
+                  </m:oMathPara>
+                </a14:m>
+                <a:endParaRPr lang="ru-RU" dirty="0"/>
+              </a:p>
+            </p:txBody>
+          </p:sp>
+        </mc:Choice>
+        <mc:Fallback>
+          <p:sp>
+            <p:nvSpPr>
+              <p:cNvPr id="32" name="TextBox 31">
+                <a:extLst>
+                  <a:ext uri="{FF2B5EF4-FFF2-40B4-BE49-F238E27FC236}">
+                    <a16:creationId xmlns:a16="http://schemas.microsoft.com/office/drawing/2014/main" id="{42130AAA-31D0-496F-8D1A-960C82851A2F}"/>
+                  </a:ext>
+                </a:extLst>
+              </p:cNvPr>
+              <p:cNvSpPr txBox="1">
+                <a:spLocks noRot="1" noChangeAspect="1" noMove="1" noResize="1" noEditPoints="1" noAdjustHandles="1" noChangeArrowheads="1" noChangeShapeType="1" noTextEdit="1"/>
+              </p:cNvSpPr>
+              <p:nvPr/>
+            </p:nvSpPr>
+            <p:spPr>
+              <a:xfrm>
+                <a:off x="5781128" y="3942105"/>
+                <a:ext cx="267124" cy="232692"/>
+              </a:xfrm>
+              <a:prstGeom prst="rect">
+                <a:avLst/>
+              </a:prstGeom>
+              <a:blipFill>
+                <a:blip r:embed="rId12"/>
+                <a:stretch>
+                  <a:fillRect l="-15909" r="-4545" b="-23684"/>
+                </a:stretch>
+              </a:blipFill>
+            </p:spPr>
+            <p:txBody>
+              <a:bodyPr/>
+              <a:lstStyle/>
+              <a:p>
+                <a:r>
+                  <a:rPr lang="ru-RU">
+                    <a:noFill/>
+                  </a:rPr>
+                  <a:t> </a:t>
+                </a:r>
+              </a:p>
+            </p:txBody>
+          </p:sp>
+        </mc:Fallback>
+      </mc:AlternateContent>
+      <mc:AlternateContent xmlns:mc="http://schemas.openxmlformats.org/markup-compatibility/2006">
+        <mc:Choice xmlns:a14="http://schemas.microsoft.com/office/drawing/2010/main" Requires="a14">
+          <p:sp>
+            <p:nvSpPr>
+              <p:cNvPr id="33" name="TextBox 32">
+                <a:extLst>
+                  <a:ext uri="{FF2B5EF4-FFF2-40B4-BE49-F238E27FC236}">
+                    <a16:creationId xmlns:a16="http://schemas.microsoft.com/office/drawing/2014/main" id="{3072BD64-0BD5-4C59-B608-60D43F3FF4C7}"/>
+                  </a:ext>
+                </a:extLst>
+              </p:cNvPr>
+              <p:cNvSpPr txBox="1"/>
+              <p:nvPr/>
+            </p:nvSpPr>
+            <p:spPr>
+              <a:xfrm>
+                <a:off x="6389542" y="3948621"/>
+                <a:ext cx="267124" cy="232692"/>
+              </a:xfrm>
+              <a:prstGeom prst="rect">
+                <a:avLst/>
+              </a:prstGeom>
+              <a:noFill/>
+            </p:spPr>
+            <p:txBody>
+              <a:bodyPr wrap="none" lIns="0" tIns="0" rIns="0" bIns="0" rtlCol="0">
+                <a:spAutoFit/>
+              </a:bodyPr>
+              <a:lstStyle/>
+              <a:p>
+                <a:pPr/>
+                <a14:m>
+                  <m:oMathPara xmlns:m="http://schemas.openxmlformats.org/officeDocument/2006/math">
+                    <m:oMathParaPr>
+                      <m:jc m:val="centerGroup"/>
+                    </m:oMathParaPr>
+                    <m:oMath xmlns:m="http://schemas.openxmlformats.org/officeDocument/2006/math">
+                      <m:sSub>
+                        <m:sSubPr>
+                          <m:ctrlPr>
+                            <a:rPr lang="el-GR" sz="1400" i="1" smtClean="0">
+                              <a:solidFill>
+                                <a:srgbClr val="FF0000"/>
+                              </a:solidFill>
+                              <a:latin typeface="Cambria Math" panose="02040503050406030204" pitchFamily="18" charset="0"/>
+                              <a:ea typeface="Cambria Math" panose="02040503050406030204" pitchFamily="18" charset="0"/>
+                            </a:rPr>
+                          </m:ctrlPr>
+                        </m:sSubPr>
+                        <m:e>
+                          <m:r>
+                            <m:rPr>
+                              <m:sty m:val="p"/>
+                            </m:rPr>
+                            <a:rPr lang="el-GR" sz="1400" i="1" smtClean="0">
+                              <a:solidFill>
+                                <a:srgbClr val="FF0000"/>
+                              </a:solidFill>
+                              <a:latin typeface="Cambria Math" panose="02040503050406030204" pitchFamily="18" charset="0"/>
+                              <a:ea typeface="Cambria Math" panose="02040503050406030204" pitchFamily="18" charset="0"/>
+                            </a:rPr>
+                            <m:t>Γ</m:t>
+                          </m:r>
+                        </m:e>
+                        <m:sub>
+                          <m:r>
+                            <a:rPr lang="en-US" sz="1400" b="0" i="1" smtClean="0">
+                              <a:solidFill>
+                                <a:srgbClr val="FF0000"/>
+                              </a:solidFill>
+                              <a:latin typeface="Cambria Math" panose="02040503050406030204" pitchFamily="18" charset="0"/>
+                              <a:ea typeface="Cambria Math" panose="02040503050406030204" pitchFamily="18" charset="0"/>
+                            </a:rPr>
+                            <m:t>𝑓</m:t>
+                          </m:r>
+                          <m:r>
+                            <a:rPr lang="ru-RU" sz="1400" b="0" i="1" smtClean="0">
+                              <a:solidFill>
+                                <a:srgbClr val="FF0000"/>
+                              </a:solidFill>
+                              <a:latin typeface="Cambria Math" panose="02040503050406030204" pitchFamily="18" charset="0"/>
+                              <a:ea typeface="Cambria Math" panose="02040503050406030204" pitchFamily="18" charset="0"/>
+                            </a:rPr>
+                            <m:t>3</m:t>
+                          </m:r>
+                        </m:sub>
+                      </m:sSub>
+                    </m:oMath>
+                  </m:oMathPara>
+                </a14:m>
+                <a:endParaRPr lang="ru-RU" dirty="0"/>
+              </a:p>
+            </p:txBody>
+          </p:sp>
+        </mc:Choice>
+        <mc:Fallback>
+          <p:sp>
+            <p:nvSpPr>
+              <p:cNvPr id="33" name="TextBox 32">
+                <a:extLst>
+                  <a:ext uri="{FF2B5EF4-FFF2-40B4-BE49-F238E27FC236}">
+                    <a16:creationId xmlns:a16="http://schemas.microsoft.com/office/drawing/2014/main" id="{3072BD64-0BD5-4C59-B608-60D43F3FF4C7}"/>
+                  </a:ext>
+                </a:extLst>
+              </p:cNvPr>
+              <p:cNvSpPr txBox="1">
+                <a:spLocks noRot="1" noChangeAspect="1" noMove="1" noResize="1" noEditPoints="1" noAdjustHandles="1" noChangeArrowheads="1" noChangeShapeType="1" noTextEdit="1"/>
+              </p:cNvSpPr>
+              <p:nvPr/>
+            </p:nvSpPr>
+            <p:spPr>
+              <a:xfrm>
+                <a:off x="6389542" y="3948621"/>
+                <a:ext cx="267124" cy="232692"/>
+              </a:xfrm>
+              <a:prstGeom prst="rect">
+                <a:avLst/>
+              </a:prstGeom>
+              <a:blipFill>
+                <a:blip r:embed="rId13"/>
+                <a:stretch>
+                  <a:fillRect l="-15909" r="-4545" b="-23684"/>
                 </a:stretch>
               </a:blipFill>
             </p:spPr>
@@ -8016,8 +8620,8 @@
               </p:style>
             </p:cxnSp>
           </p:grpSp>
-          <mc:AlternateContent xmlns:mc="http://schemas.openxmlformats.org/markup-compatibility/2006">
-            <mc:Choice xmlns:a14="http://schemas.microsoft.com/office/drawing/2010/main" Requires="a14">
+          <mc:AlternateContent xmlns:mc="http://schemas.openxmlformats.org/markup-compatibility/2006" xmlns:a14="http://schemas.microsoft.com/office/drawing/2010/main">
+            <mc:Choice Requires="a14">
               <p:sp>
                 <p:nvSpPr>
                   <p:cNvPr id="116" name="TextBox 115">
@@ -8094,7 +8698,7 @@
                 </p:txBody>
               </p:sp>
             </mc:Choice>
-            <mc:Fallback>
+            <mc:Fallback xmlns="">
               <p:sp>
                 <p:nvSpPr>
                   <p:cNvPr id="116" name="TextBox 115">
@@ -8139,8 +8743,8 @@
               </p:sp>
             </mc:Fallback>
           </mc:AlternateContent>
-          <mc:AlternateContent xmlns:mc="http://schemas.openxmlformats.org/markup-compatibility/2006">
-            <mc:Choice xmlns:a14="http://schemas.microsoft.com/office/drawing/2010/main" Requires="a14">
+          <mc:AlternateContent xmlns:mc="http://schemas.openxmlformats.org/markup-compatibility/2006" xmlns:a14="http://schemas.microsoft.com/office/drawing/2010/main">
+            <mc:Choice Requires="a14">
               <p:sp>
                 <p:nvSpPr>
                   <p:cNvPr id="117" name="TextBox 116">
@@ -8217,7 +8821,7 @@
                 </p:txBody>
               </p:sp>
             </mc:Choice>
-            <mc:Fallback>
+            <mc:Fallback xmlns="">
               <p:sp>
                 <p:nvSpPr>
                   <p:cNvPr id="117" name="TextBox 116">
@@ -8262,8 +8866,8 @@
               </p:sp>
             </mc:Fallback>
           </mc:AlternateContent>
-          <mc:AlternateContent xmlns:mc="http://schemas.openxmlformats.org/markup-compatibility/2006">
-            <mc:Choice xmlns:a14="http://schemas.microsoft.com/office/drawing/2010/main" Requires="a14">
+          <mc:AlternateContent xmlns:mc="http://schemas.openxmlformats.org/markup-compatibility/2006" xmlns:a14="http://schemas.microsoft.com/office/drawing/2010/main">
+            <mc:Choice Requires="a14">
               <p:sp>
                 <p:nvSpPr>
                   <p:cNvPr id="118" name="TextBox 117">
@@ -8340,7 +8944,7 @@
                 </p:txBody>
               </p:sp>
             </mc:Choice>
-            <mc:Fallback>
+            <mc:Fallback xmlns="">
               <p:sp>
                 <p:nvSpPr>
                   <p:cNvPr id="118" name="TextBox 117">
@@ -8385,8 +8989,8 @@
               </p:sp>
             </mc:Fallback>
           </mc:AlternateContent>
-          <mc:AlternateContent xmlns:mc="http://schemas.openxmlformats.org/markup-compatibility/2006">
-            <mc:Choice xmlns:a14="http://schemas.microsoft.com/office/drawing/2010/main" Requires="a14">
+          <mc:AlternateContent xmlns:mc="http://schemas.openxmlformats.org/markup-compatibility/2006" xmlns:a14="http://schemas.microsoft.com/office/drawing/2010/main">
+            <mc:Choice Requires="a14">
               <p:sp>
                 <p:nvSpPr>
                   <p:cNvPr id="119" name="TextBox 118">
@@ -8463,7 +9067,7 @@
                 </p:txBody>
               </p:sp>
             </mc:Choice>
-            <mc:Fallback>
+            <mc:Fallback xmlns="">
               <p:sp>
                 <p:nvSpPr>
                   <p:cNvPr id="119" name="TextBox 118">
@@ -8508,8 +9112,8 @@
               </p:sp>
             </mc:Fallback>
           </mc:AlternateContent>
-          <mc:AlternateContent xmlns:mc="http://schemas.openxmlformats.org/markup-compatibility/2006">
-            <mc:Choice xmlns:a14="http://schemas.microsoft.com/office/drawing/2010/main" Requires="a14">
+          <mc:AlternateContent xmlns:mc="http://schemas.openxmlformats.org/markup-compatibility/2006" xmlns:a14="http://schemas.microsoft.com/office/drawing/2010/main">
+            <mc:Choice Requires="a14">
               <p:sp>
                 <p:nvSpPr>
                   <p:cNvPr id="120" name="TextBox 119">
@@ -8586,7 +9190,7 @@
                 </p:txBody>
               </p:sp>
             </mc:Choice>
-            <mc:Fallback>
+            <mc:Fallback xmlns="">
               <p:sp>
                 <p:nvSpPr>
                   <p:cNvPr id="120" name="TextBox 119">
@@ -8632,8 +9236,8 @@
             </mc:Fallback>
           </mc:AlternateContent>
         </p:grpSp>
-        <mc:AlternateContent xmlns:mc="http://schemas.openxmlformats.org/markup-compatibility/2006">
-          <mc:Choice xmlns:a14="http://schemas.microsoft.com/office/drawing/2010/main" Requires="a14">
+        <mc:AlternateContent xmlns:mc="http://schemas.openxmlformats.org/markup-compatibility/2006" xmlns:a14="http://schemas.microsoft.com/office/drawing/2010/main">
+          <mc:Choice Requires="a14">
             <p:sp>
               <p:nvSpPr>
                 <p:cNvPr id="115" name="TextBox 114">
@@ -8689,7 +9293,7 @@
               </p:txBody>
             </p:sp>
           </mc:Choice>
-          <mc:Fallback>
+          <mc:Fallback xmlns="">
             <p:sp>
               <p:nvSpPr>
                 <p:cNvPr id="115" name="TextBox 114">

</xml_diff>